<commit_message>
Changed some Final Presentation Stuff
</commit_message>
<xml_diff>
--- a/Final Presentation Slides/T05 Final Presentation.pptx
+++ b/Final Presentation Slides/T05 Final Presentation.pptx
@@ -197,7 +197,7 @@
           <a:bodyPr anchor="b" bIns="0" lIns="0" rIns="0" tIns="0" wrap="none"/>
           <a:p>
             <a:pPr algn="r"/>
-            <a:fld id="{A1018131-3141-4111-B131-21B13151F1A1}" type="slidenum">
+            <a:fld id="{8141E191-A101-4111-B1E1-01A1A151E1B1}" type="slidenum">
               <a:rPr lang="en-US"/>
               <a:t>&lt;number&gt;</a:t>
             </a:fld>
@@ -251,7 +251,7 @@
                 <a:spcPct val="100000"/>
               </a:lnSpc>
             </a:pPr>
-            <a:fld id="{51D12111-61F1-4111-91B1-71A14151B131}" type="slidenum">
+            <a:fld id="{71516121-D191-4181-B191-017161F1C1C1}" type="slidenum">
               <a:rPr lang="en-US">
                 <a:solidFill>
                   <a:srgbClr val="000000"/>
@@ -366,7 +366,7 @@
                 <a:spcPct val="100000"/>
               </a:lnSpc>
             </a:pPr>
-            <a:fld id="{C1F13191-D181-41F1-9181-711171018111}" type="slidenum">
+            <a:fld id="{71D181F1-0131-41E1-91D1-A19161718141}" type="slidenum">
               <a:rPr lang="en-US">
                 <a:solidFill>
                   <a:srgbClr val="ffffff"/>
@@ -455,7 +455,7 @@
                 <a:spcPct val="100000"/>
               </a:lnSpc>
             </a:pPr>
-            <a:fld id="{A171C1F1-A100-4141-91A1-D17181A13131}" type="slidenum">
+            <a:fld id="{B1D18191-4191-4121-81A1-6171E1B1B1D1}" type="slidenum">
               <a:rPr lang="en-US">
                 <a:solidFill>
                   <a:srgbClr val="ffffff"/>
@@ -540,7 +540,7 @@
                 <a:spcPct val="100000"/>
               </a:lnSpc>
             </a:pPr>
-            <a:fld id="{C1C181A1-2151-41C1-A1F1-A1B1C141D151}" type="slidenum">
+            <a:fld id="{0181C191-A1C1-4181-A161-01E121616181}" type="slidenum">
               <a:rPr lang="en-US">
                 <a:solidFill>
                   <a:srgbClr val="ffffff"/>
@@ -625,7 +625,7 @@
                 <a:spcPct val="100000"/>
               </a:lnSpc>
             </a:pPr>
-            <a:fld id="{61013111-3141-4111-9101-411161015131}" type="slidenum">
+            <a:fld id="{D191C1B1-3131-4161-A1D1-C191517131B1}" type="slidenum">
               <a:rPr lang="en-US">
                 <a:solidFill>
                   <a:srgbClr val="ffffff"/>
@@ -710,7 +710,7 @@
                 <a:spcPct val="100000"/>
               </a:lnSpc>
             </a:pPr>
-            <a:fld id="{31C101B1-E161-4111-A171-415191F11131}" type="slidenum">
+            <a:fld id="{11E191E1-0161-4161-8181-7121211121F1}" type="slidenum">
               <a:rPr lang="en-US">
                 <a:solidFill>
                   <a:srgbClr val="ffffff"/>
@@ -799,7 +799,7 @@
                 <a:spcPct val="100000"/>
               </a:lnSpc>
             </a:pPr>
-            <a:fld id="{E1613141-E111-41D1-B141-A12111A1D121}" type="slidenum">
+            <a:fld id="{A13161E1-5161-41E1-9121-811111D1B101}" type="slidenum">
               <a:rPr lang="en-US">
                 <a:solidFill>
                   <a:srgbClr val="ffffff"/>
@@ -888,7 +888,7 @@
                 <a:spcPct val="100000"/>
               </a:lnSpc>
             </a:pPr>
-            <a:fld id="{A11161D1-8111-4131-81F1-11112181E1B1}" type="slidenum">
+            <a:fld id="{A1B18191-0191-4121-8131-8101B1E191B1}" type="slidenum">
               <a:rPr lang="en-US">
                 <a:solidFill>
                   <a:srgbClr val="ffffff"/>
@@ -977,7 +977,7 @@
                 <a:spcPct val="100000"/>
               </a:lnSpc>
             </a:pPr>
-            <a:fld id="{A16111E1-1171-41E1-B131-A1010101A101}" type="slidenum">
+            <a:fld id="{513121D1-31A1-4161-8161-A1D1E1F18111}" type="slidenum">
               <a:rPr lang="en-US">
                 <a:solidFill>
                   <a:srgbClr val="ffffff"/>
@@ -1066,7 +1066,7 @@
                 <a:spcPct val="100000"/>
               </a:lnSpc>
             </a:pPr>
-            <a:fld id="{4141E1F1-61E1-41D1-91B1-3121E1E15121}" type="slidenum">
+            <a:fld id="{9151D121-C1D1-41E1-A191-E17141F1E131}" type="slidenum">
               <a:rPr lang="en-US">
                 <a:solidFill>
                   <a:srgbClr val="ffffff"/>
@@ -1151,7 +1151,7 @@
                 <a:spcPct val="100000"/>
               </a:lnSpc>
             </a:pPr>
-            <a:fld id="{21A1C191-2101-41C1-81C1-F1A18171E1C1}" type="slidenum">
+            <a:fld id="{417161D1-71B1-4131-8141-4171F151E1A1}" type="slidenum">
               <a:rPr lang="en-US">
                 <a:solidFill>
                   <a:srgbClr val="ffffff"/>
@@ -1240,7 +1240,7 @@
                 <a:spcPct val="100000"/>
               </a:lnSpc>
             </a:pPr>
-            <a:fld id="{3151B1A1-11E1-4111-91B1-11E171B1C1E1}" type="slidenum">
+            <a:fld id="{81919121-F191-4151-8101-7131217161F1}" type="slidenum">
               <a:rPr lang="en-US">
                 <a:solidFill>
                   <a:srgbClr val="ffffff"/>
@@ -1325,7 +1325,7 @@
                 <a:spcPct val="100000"/>
               </a:lnSpc>
             </a:pPr>
-            <a:fld id="{01B14141-1181-4111-A131-51B17111E1A1}" type="slidenum">
+            <a:fld id="{71719131-8111-41A1-9101-E111C1819151}" type="slidenum">
               <a:rPr lang="en-US">
                 <a:solidFill>
                   <a:srgbClr val="ffffff"/>
@@ -1438,7 +1438,7 @@
                 <a:spcPct val="100000"/>
               </a:lnSpc>
             </a:pPr>
-            <a:fld id="{F1D11161-8181-41B1-A171-51118121D131}" type="slidenum">
+            <a:fld id="{A13131B1-B181-4151-B1E1-217181D15161}" type="slidenum">
               <a:rPr lang="en-US">
                 <a:solidFill>
                   <a:srgbClr val="ffffff"/>
@@ -1548,7 +1548,7 @@
                 <a:spcPct val="100000"/>
               </a:lnSpc>
             </a:pPr>
-            <a:fld id="{21017181-0181-4111-9121-9171A1C10181}" type="slidenum">
+            <a:fld id="{515101E1-5131-41E1-91B1-51A1A1116151}" type="slidenum">
               <a:rPr lang="en-US">
                 <a:solidFill>
                   <a:srgbClr val="ffffff"/>
@@ -1637,7 +1637,7 @@
                 <a:spcPct val="100000"/>
               </a:lnSpc>
             </a:pPr>
-            <a:fld id="{01D18141-91B1-41A1-91C1-118121617121}" type="slidenum">
+            <a:fld id="{518141A1-7151-4101-81E1-D181B121A1D1}" type="slidenum">
               <a:rPr lang="en-US">
                 <a:solidFill>
                   <a:srgbClr val="ffffff"/>
@@ -1754,7 +1754,7 @@
                 <a:spcPct val="100000"/>
               </a:lnSpc>
             </a:pPr>
-            <a:fld id="{0131E131-21E1-4100-A161-5111C121F1E1}" type="slidenum">
+            <a:fld id="{414111D1-F1B1-4191-81C1-6101915191B1}" type="slidenum">
               <a:rPr lang="en-US">
                 <a:solidFill>
                   <a:srgbClr val="ffffff"/>
@@ -1839,7 +1839,7 @@
                 <a:spcPct val="100000"/>
               </a:lnSpc>
             </a:pPr>
-            <a:fld id="{21A18131-3131-4161-A181-81B161C101D1}" type="slidenum">
+            <a:fld id="{D1C11101-C1A1-41C1-9161-3181F151B191}" type="slidenum">
               <a:rPr lang="en-US">
                 <a:solidFill>
                   <a:srgbClr val="ffffff"/>
@@ -1924,7 +1924,7 @@
                 <a:spcPct val="100000"/>
               </a:lnSpc>
             </a:pPr>
-            <a:fld id="{01418101-3191-41F1-B181-51F191D10191}" type="slidenum">
+            <a:fld id="{41A1B1C1-11B1-41C1-9171-61E161919191}" type="slidenum">
               <a:rPr lang="en-US">
                 <a:solidFill>
                   <a:srgbClr val="ffffff"/>
@@ -2013,7 +2013,7 @@
                 <a:spcPct val="100000"/>
               </a:lnSpc>
             </a:pPr>
-            <a:fld id="{E171C1F1-31A1-4131-B191-F121D1D111A1}" type="slidenum">
+            <a:fld id="{B1B101A1-C151-41B1-B1B1-01D1115161A1}" type="slidenum">
               <a:rPr lang="en-US">
                 <a:solidFill>
                   <a:srgbClr val="ffffff"/>
@@ -4294,14 +4294,14 @@
               </a:rPr>
               <a:t>12/10/2015 , </a:t>
             </a:r>
-            <a:fld id="{81D1C1E1-E1F1-4181-81B1-F1F11161E191}" type="slidenum">
+            <a:fld id="{81018121-5161-4191-8121-61B1716161F1}" type="slidenum">
               <a:rPr lang="en-US" sz="1200">
                 <a:solidFill>
                   <a:srgbClr val="ffffff"/>
                 </a:solidFill>
                 <a:latin typeface="Georgia"/>
               </a:rPr>
-              <a:t>&lt;number&gt;</a:t>
+              <a:t>19</a:t>
             </a:fld>
             <a:endParaRPr/>
           </a:p>
@@ -4565,7 +4565,7 @@
               </a:rPr>
               <a:t>12/10/2015 , </a:t>
             </a:r>
-            <a:fld id="{6141B1A1-8171-4101-A171-D13151D181D1}" type="slidenum">
+            <a:fld id="{11E15121-2171-41C1-B141-91C121912161}" type="slidenum">
               <a:rPr lang="en-US" sz="1200">
                 <a:solidFill>
                   <a:srgbClr val="ffffff"/>

</xml_diff>

<commit_message>
Revert "Final Project changes"
This reverts commit d92d7db23d964a298613bc6a2529ed2bf12aaeac.
</commit_message>
<xml_diff>
--- a/Final Presentation Slides/T05 Final Presentation.pptx
+++ b/Final Presentation Slides/T05 Final Presentation.pptx
@@ -197,7 +197,7 @@
           <a:bodyPr anchor="b" bIns="0" lIns="0" rIns="0" tIns="0" wrap="none"/>
           <a:p>
             <a:pPr algn="r"/>
-            <a:fld id="{31010031-F1C1-4111-91F1-616131A151D1}" type="slidenum">
+            <a:fld id="{8141E191-A101-4111-B1E1-01A1A151E1B1}" type="slidenum">
               <a:rPr lang="en-US"/>
               <a:t>&lt;number&gt;</a:t>
             </a:fld>
@@ -251,7 +251,7 @@
                 <a:spcPct val="100000"/>
               </a:lnSpc>
             </a:pPr>
-            <a:fld id="{21518121-D151-4121-B1F1-31C101613191}" type="slidenum">
+            <a:fld id="{71516121-D191-4181-B191-017161F1C1C1}" type="slidenum">
               <a:rPr lang="en-US">
                 <a:solidFill>
                   <a:srgbClr val="000000"/>
@@ -366,7 +366,7 @@
                 <a:spcPct val="100000"/>
               </a:lnSpc>
             </a:pPr>
-            <a:fld id="{E12131E1-F121-4101-9151-113101F11111}" type="slidenum">
+            <a:fld id="{71D181F1-0131-41E1-91D1-A19161718141}" type="slidenum">
               <a:rPr lang="en-US">
                 <a:solidFill>
                   <a:srgbClr val="ffffff"/>
@@ -455,7 +455,7 @@
                 <a:spcPct val="100000"/>
               </a:lnSpc>
             </a:pPr>
-            <a:fld id="{D1615101-41B1-4121-91C1-51B121B12111}" type="slidenum">
+            <a:fld id="{B1D18191-4191-4121-81A1-6171E1B1B1D1}" type="slidenum">
               <a:rPr lang="en-US">
                 <a:solidFill>
                   <a:srgbClr val="ffffff"/>
@@ -540,7 +540,7 @@
                 <a:spcPct val="100000"/>
               </a:lnSpc>
             </a:pPr>
-            <a:fld id="{D1D17181-B141-4111-8141-91A181716111}" type="slidenum">
+            <a:fld id="{0181C191-A1C1-4181-A161-01E121616181}" type="slidenum">
               <a:rPr lang="en-US">
                 <a:solidFill>
                   <a:srgbClr val="ffffff"/>
@@ -625,7 +625,7 @@
                 <a:spcPct val="100000"/>
               </a:lnSpc>
             </a:pPr>
-            <a:fld id="{9101B1C1-7171-4181-A151-418121E12161}" type="slidenum">
+            <a:fld id="{D191C1B1-3131-4161-A1D1-C191517131B1}" type="slidenum">
               <a:rPr lang="en-US">
                 <a:solidFill>
                   <a:srgbClr val="ffffff"/>
@@ -710,7 +710,7 @@
                 <a:spcPct val="100000"/>
               </a:lnSpc>
             </a:pPr>
-            <a:fld id="{1171A171-A1A1-4141-8121-E11131B1A1D1}" type="slidenum">
+            <a:fld id="{11E191E1-0161-4161-8181-7121211121F1}" type="slidenum">
               <a:rPr lang="en-US">
                 <a:solidFill>
                   <a:srgbClr val="ffffff"/>
@@ -799,7 +799,7 @@
                 <a:spcPct val="100000"/>
               </a:lnSpc>
             </a:pPr>
-            <a:fld id="{11A151D1-A1B1-4151-8191-F161D1B13191}" type="slidenum">
+            <a:fld id="{A13161E1-5161-41E1-9121-811111D1B101}" type="slidenum">
               <a:rPr lang="en-US">
                 <a:solidFill>
                   <a:srgbClr val="ffffff"/>
@@ -888,7 +888,7 @@
                 <a:spcPct val="100000"/>
               </a:lnSpc>
             </a:pPr>
-            <a:fld id="{F1115131-F1A1-41B1-81A1-818181618111}" type="slidenum">
+            <a:fld id="{A1B18191-0191-4121-8131-8101B1E191B1}" type="slidenum">
               <a:rPr lang="en-US">
                 <a:solidFill>
                   <a:srgbClr val="ffffff"/>
@@ -977,7 +977,7 @@
                 <a:spcPct val="100000"/>
               </a:lnSpc>
             </a:pPr>
-            <a:fld id="{D151C191-91A1-41D1-81A1-11618161F1C1}" type="slidenum">
+            <a:fld id="{513121D1-31A1-4161-8161-A1D1E1F18111}" type="slidenum">
               <a:rPr lang="en-US">
                 <a:solidFill>
                   <a:srgbClr val="ffffff"/>
@@ -1066,7 +1066,7 @@
                 <a:spcPct val="100000"/>
               </a:lnSpc>
             </a:pPr>
-            <a:fld id="{11D1D131-61C1-4151-81A1-21D181F1D1B1}" type="slidenum">
+            <a:fld id="{9151D121-C1D1-41E1-A191-E17141F1E131}" type="slidenum">
               <a:rPr lang="en-US">
                 <a:solidFill>
                   <a:srgbClr val="ffffff"/>
@@ -1151,7 +1151,7 @@
                 <a:spcPct val="100000"/>
               </a:lnSpc>
             </a:pPr>
-            <a:fld id="{C121D181-D191-4111-8141-8141410121C1}" type="slidenum">
+            <a:fld id="{417161D1-71B1-4131-8141-4171F151E1A1}" type="slidenum">
               <a:rPr lang="en-US">
                 <a:solidFill>
                   <a:srgbClr val="ffffff"/>
@@ -1240,7 +1240,7 @@
                 <a:spcPct val="100000"/>
               </a:lnSpc>
             </a:pPr>
-            <a:fld id="{4131A1E1-21C1-4161-A171-D1715101A1C1}" type="slidenum">
+            <a:fld id="{81919121-F191-4151-8101-7131217161F1}" type="slidenum">
               <a:rPr lang="en-US">
                 <a:solidFill>
                   <a:srgbClr val="ffffff"/>
@@ -1325,7 +1325,7 @@
                 <a:spcPct val="100000"/>
               </a:lnSpc>
             </a:pPr>
-            <a:fld id="{81C1B141-71F1-4181-A171-1121C131A111}" type="slidenum">
+            <a:fld id="{71719131-8111-41A1-9101-E111C1819151}" type="slidenum">
               <a:rPr lang="en-US">
                 <a:solidFill>
                   <a:srgbClr val="ffffff"/>
@@ -1438,7 +1438,7 @@
                 <a:spcPct val="100000"/>
               </a:lnSpc>
             </a:pPr>
-            <a:fld id="{A1A18151-91B1-41F1-A131-71616191B171}" type="slidenum">
+            <a:fld id="{A13131B1-B181-4151-B1E1-217181D15161}" type="slidenum">
               <a:rPr lang="en-US">
                 <a:solidFill>
                   <a:srgbClr val="ffffff"/>
@@ -1548,7 +1548,7 @@
                 <a:spcPct val="100000"/>
               </a:lnSpc>
             </a:pPr>
-            <a:fld id="{21519191-2131-41C1-8161-711111B19171}" type="slidenum">
+            <a:fld id="{515101E1-5131-41E1-91B1-51A1A1116151}" type="slidenum">
               <a:rPr lang="en-US">
                 <a:solidFill>
                   <a:srgbClr val="ffffff"/>
@@ -1637,7 +1637,7 @@
                 <a:spcPct val="100000"/>
               </a:lnSpc>
             </a:pPr>
-            <a:fld id="{A1916151-B1C1-41B1-9131-F101F1D1D191}" type="slidenum">
+            <a:fld id="{518141A1-7151-4101-81E1-D181B121A1D1}" type="slidenum">
               <a:rPr lang="en-US">
                 <a:solidFill>
                   <a:srgbClr val="ffffff"/>
@@ -1754,7 +1754,7 @@
                 <a:spcPct val="100000"/>
               </a:lnSpc>
             </a:pPr>
-            <a:fld id="{E1D12141-91C1-4131-8121-B1F181915171}" type="slidenum">
+            <a:fld id="{414111D1-F1B1-4191-81C1-6101915191B1}" type="slidenum">
               <a:rPr lang="en-US">
                 <a:solidFill>
                   <a:srgbClr val="ffffff"/>
@@ -1839,7 +1839,7 @@
                 <a:spcPct val="100000"/>
               </a:lnSpc>
             </a:pPr>
-            <a:fld id="{815161D1-F101-4121-A121-91017131B131}" type="slidenum">
+            <a:fld id="{D1C11101-C1A1-41C1-9161-3181F151B191}" type="slidenum">
               <a:rPr lang="en-US">
                 <a:solidFill>
                   <a:srgbClr val="ffffff"/>
@@ -1924,7 +1924,7 @@
                 <a:spcPct val="100000"/>
               </a:lnSpc>
             </a:pPr>
-            <a:fld id="{E1B1F161-1111-4131-B141-71A1212181D1}" type="slidenum">
+            <a:fld id="{41A1B1C1-11B1-41C1-9171-61E161919191}" type="slidenum">
               <a:rPr lang="en-US">
                 <a:solidFill>
                   <a:srgbClr val="ffffff"/>
@@ -2013,7 +2013,7 @@
                 <a:spcPct val="100000"/>
               </a:lnSpc>
             </a:pPr>
-            <a:fld id="{7131C131-6101-41B1-A181-F161512101C1}" type="slidenum">
+            <a:fld id="{B1B101A1-C151-41B1-B1B1-01D1115161A1}" type="slidenum">
               <a:rPr lang="en-US">
                 <a:solidFill>
                   <a:srgbClr val="ffffff"/>
@@ -4294,14 +4294,14 @@
               </a:rPr>
               <a:t>12/10/2015 , </a:t>
             </a:r>
-            <a:fld id="{01510111-1181-41B1-91B1-C18121915121}" type="slidenum">
+            <a:fld id="{81018121-5161-4191-8121-61B1716161F1}" type="slidenum">
               <a:rPr lang="en-US" sz="1200">
                 <a:solidFill>
                   <a:srgbClr val="ffffff"/>
                 </a:solidFill>
                 <a:latin typeface="Georgia"/>
               </a:rPr>
-              <a:t>&lt;number&gt;</a:t>
+              <a:t>19</a:t>
             </a:fld>
             <a:endParaRPr/>
           </a:p>
@@ -4565,7 +4565,7 @@
               </a:rPr>
               <a:t>12/10/2015 , </a:t>
             </a:r>
-            <a:fld id="{A1E1F151-4191-41A1-A171-A15161113111}" type="slidenum">
+            <a:fld id="{11E15121-2171-41C1-B141-91C121912161}" type="slidenum">
               <a:rPr lang="en-US" sz="1200">
                 <a:solidFill>
                   <a:srgbClr val="ffffff"/>

</xml_diff>

<commit_message>
Revert "Changed some Final Presentation Stuff"
This reverts commit 77ec1d4afca198d2e1bcef8c836bc6880bc614fa.
</commit_message>
<xml_diff>
--- a/Final Presentation Slides/T05 Final Presentation.pptx
+++ b/Final Presentation Slides/T05 Final Presentation.pptx
@@ -197,7 +197,7 @@
           <a:bodyPr anchor="b" bIns="0" lIns="0" rIns="0" tIns="0" wrap="none"/>
           <a:p>
             <a:pPr algn="r"/>
-            <a:fld id="{8141E191-A101-4111-B1E1-01A1A151E1B1}" type="slidenum">
+            <a:fld id="{A1018131-3141-4111-B131-21B13151F1A1}" type="slidenum">
               <a:rPr lang="en-US"/>
               <a:t>&lt;number&gt;</a:t>
             </a:fld>
@@ -251,7 +251,7 @@
                 <a:spcPct val="100000"/>
               </a:lnSpc>
             </a:pPr>
-            <a:fld id="{71516121-D191-4181-B191-017161F1C1C1}" type="slidenum">
+            <a:fld id="{51D12111-61F1-4111-91B1-71A14151B131}" type="slidenum">
               <a:rPr lang="en-US">
                 <a:solidFill>
                   <a:srgbClr val="000000"/>
@@ -366,7 +366,7 @@
                 <a:spcPct val="100000"/>
               </a:lnSpc>
             </a:pPr>
-            <a:fld id="{71D181F1-0131-41E1-91D1-A19161718141}" type="slidenum">
+            <a:fld id="{C1F13191-D181-41F1-9181-711171018111}" type="slidenum">
               <a:rPr lang="en-US">
                 <a:solidFill>
                   <a:srgbClr val="ffffff"/>
@@ -455,7 +455,7 @@
                 <a:spcPct val="100000"/>
               </a:lnSpc>
             </a:pPr>
-            <a:fld id="{B1D18191-4191-4121-81A1-6171E1B1B1D1}" type="slidenum">
+            <a:fld id="{A171C1F1-A100-4141-91A1-D17181A13131}" type="slidenum">
               <a:rPr lang="en-US">
                 <a:solidFill>
                   <a:srgbClr val="ffffff"/>
@@ -540,7 +540,7 @@
                 <a:spcPct val="100000"/>
               </a:lnSpc>
             </a:pPr>
-            <a:fld id="{0181C191-A1C1-4181-A161-01E121616181}" type="slidenum">
+            <a:fld id="{C1C181A1-2151-41C1-A1F1-A1B1C141D151}" type="slidenum">
               <a:rPr lang="en-US">
                 <a:solidFill>
                   <a:srgbClr val="ffffff"/>
@@ -625,7 +625,7 @@
                 <a:spcPct val="100000"/>
               </a:lnSpc>
             </a:pPr>
-            <a:fld id="{D191C1B1-3131-4161-A1D1-C191517131B1}" type="slidenum">
+            <a:fld id="{61013111-3141-4111-9101-411161015131}" type="slidenum">
               <a:rPr lang="en-US">
                 <a:solidFill>
                   <a:srgbClr val="ffffff"/>
@@ -710,7 +710,7 @@
                 <a:spcPct val="100000"/>
               </a:lnSpc>
             </a:pPr>
-            <a:fld id="{11E191E1-0161-4161-8181-7121211121F1}" type="slidenum">
+            <a:fld id="{31C101B1-E161-4111-A171-415191F11131}" type="slidenum">
               <a:rPr lang="en-US">
                 <a:solidFill>
                   <a:srgbClr val="ffffff"/>
@@ -799,7 +799,7 @@
                 <a:spcPct val="100000"/>
               </a:lnSpc>
             </a:pPr>
-            <a:fld id="{A13161E1-5161-41E1-9121-811111D1B101}" type="slidenum">
+            <a:fld id="{E1613141-E111-41D1-B141-A12111A1D121}" type="slidenum">
               <a:rPr lang="en-US">
                 <a:solidFill>
                   <a:srgbClr val="ffffff"/>
@@ -888,7 +888,7 @@
                 <a:spcPct val="100000"/>
               </a:lnSpc>
             </a:pPr>
-            <a:fld id="{A1B18191-0191-4121-8131-8101B1E191B1}" type="slidenum">
+            <a:fld id="{A11161D1-8111-4131-81F1-11112181E1B1}" type="slidenum">
               <a:rPr lang="en-US">
                 <a:solidFill>
                   <a:srgbClr val="ffffff"/>
@@ -977,7 +977,7 @@
                 <a:spcPct val="100000"/>
               </a:lnSpc>
             </a:pPr>
-            <a:fld id="{513121D1-31A1-4161-8161-A1D1E1F18111}" type="slidenum">
+            <a:fld id="{A16111E1-1171-41E1-B131-A1010101A101}" type="slidenum">
               <a:rPr lang="en-US">
                 <a:solidFill>
                   <a:srgbClr val="ffffff"/>
@@ -1066,7 +1066,7 @@
                 <a:spcPct val="100000"/>
               </a:lnSpc>
             </a:pPr>
-            <a:fld id="{9151D121-C1D1-41E1-A191-E17141F1E131}" type="slidenum">
+            <a:fld id="{4141E1F1-61E1-41D1-91B1-3121E1E15121}" type="slidenum">
               <a:rPr lang="en-US">
                 <a:solidFill>
                   <a:srgbClr val="ffffff"/>
@@ -1151,7 +1151,7 @@
                 <a:spcPct val="100000"/>
               </a:lnSpc>
             </a:pPr>
-            <a:fld id="{417161D1-71B1-4131-8141-4171F151E1A1}" type="slidenum">
+            <a:fld id="{21A1C191-2101-41C1-81C1-F1A18171E1C1}" type="slidenum">
               <a:rPr lang="en-US">
                 <a:solidFill>
                   <a:srgbClr val="ffffff"/>
@@ -1240,7 +1240,7 @@
                 <a:spcPct val="100000"/>
               </a:lnSpc>
             </a:pPr>
-            <a:fld id="{81919121-F191-4151-8101-7131217161F1}" type="slidenum">
+            <a:fld id="{3151B1A1-11E1-4111-91B1-11E171B1C1E1}" type="slidenum">
               <a:rPr lang="en-US">
                 <a:solidFill>
                   <a:srgbClr val="ffffff"/>
@@ -1325,7 +1325,7 @@
                 <a:spcPct val="100000"/>
               </a:lnSpc>
             </a:pPr>
-            <a:fld id="{71719131-8111-41A1-9101-E111C1819151}" type="slidenum">
+            <a:fld id="{01B14141-1181-4111-A131-51B17111E1A1}" type="slidenum">
               <a:rPr lang="en-US">
                 <a:solidFill>
                   <a:srgbClr val="ffffff"/>
@@ -1438,7 +1438,7 @@
                 <a:spcPct val="100000"/>
               </a:lnSpc>
             </a:pPr>
-            <a:fld id="{A13131B1-B181-4151-B1E1-217181D15161}" type="slidenum">
+            <a:fld id="{F1D11161-8181-41B1-A171-51118121D131}" type="slidenum">
               <a:rPr lang="en-US">
                 <a:solidFill>
                   <a:srgbClr val="ffffff"/>
@@ -1548,7 +1548,7 @@
                 <a:spcPct val="100000"/>
               </a:lnSpc>
             </a:pPr>
-            <a:fld id="{515101E1-5131-41E1-91B1-51A1A1116151}" type="slidenum">
+            <a:fld id="{21017181-0181-4111-9121-9171A1C10181}" type="slidenum">
               <a:rPr lang="en-US">
                 <a:solidFill>
                   <a:srgbClr val="ffffff"/>
@@ -1637,7 +1637,7 @@
                 <a:spcPct val="100000"/>
               </a:lnSpc>
             </a:pPr>
-            <a:fld id="{518141A1-7151-4101-81E1-D181B121A1D1}" type="slidenum">
+            <a:fld id="{01D18141-91B1-41A1-91C1-118121617121}" type="slidenum">
               <a:rPr lang="en-US">
                 <a:solidFill>
                   <a:srgbClr val="ffffff"/>
@@ -1754,7 +1754,7 @@
                 <a:spcPct val="100000"/>
               </a:lnSpc>
             </a:pPr>
-            <a:fld id="{414111D1-F1B1-4191-81C1-6101915191B1}" type="slidenum">
+            <a:fld id="{0131E131-21E1-4100-A161-5111C121F1E1}" type="slidenum">
               <a:rPr lang="en-US">
                 <a:solidFill>
                   <a:srgbClr val="ffffff"/>
@@ -1839,7 +1839,7 @@
                 <a:spcPct val="100000"/>
               </a:lnSpc>
             </a:pPr>
-            <a:fld id="{D1C11101-C1A1-41C1-9161-3181F151B191}" type="slidenum">
+            <a:fld id="{21A18131-3131-4161-A181-81B161C101D1}" type="slidenum">
               <a:rPr lang="en-US">
                 <a:solidFill>
                   <a:srgbClr val="ffffff"/>
@@ -1924,7 +1924,7 @@
                 <a:spcPct val="100000"/>
               </a:lnSpc>
             </a:pPr>
-            <a:fld id="{41A1B1C1-11B1-41C1-9171-61E161919191}" type="slidenum">
+            <a:fld id="{01418101-3191-41F1-B181-51F191D10191}" type="slidenum">
               <a:rPr lang="en-US">
                 <a:solidFill>
                   <a:srgbClr val="ffffff"/>
@@ -2013,7 +2013,7 @@
                 <a:spcPct val="100000"/>
               </a:lnSpc>
             </a:pPr>
-            <a:fld id="{B1B101A1-C151-41B1-B1B1-01D1115161A1}" type="slidenum">
+            <a:fld id="{E171C1F1-31A1-4131-B191-F121D1D111A1}" type="slidenum">
               <a:rPr lang="en-US">
                 <a:solidFill>
                   <a:srgbClr val="ffffff"/>
@@ -4294,14 +4294,14 @@
               </a:rPr>
               <a:t>12/10/2015 , </a:t>
             </a:r>
-            <a:fld id="{81018121-5161-4191-8121-61B1716161F1}" type="slidenum">
+            <a:fld id="{81D1C1E1-E1F1-4181-81B1-F1F11161E191}" type="slidenum">
               <a:rPr lang="en-US" sz="1200">
                 <a:solidFill>
                   <a:srgbClr val="ffffff"/>
                 </a:solidFill>
                 <a:latin typeface="Georgia"/>
               </a:rPr>
-              <a:t>19</a:t>
+              <a:t>&lt;number&gt;</a:t>
             </a:fld>
             <a:endParaRPr/>
           </a:p>
@@ -4565,7 +4565,7 @@
               </a:rPr>
               <a:t>12/10/2015 , </a:t>
             </a:r>
-            <a:fld id="{11E15121-2171-41C1-B141-91C121912161}" type="slidenum">
+            <a:fld id="{6141B1A1-8171-4101-A171-D13151D181D1}" type="slidenum">
               <a:rPr lang="en-US" sz="1200">
                 <a:solidFill>
                   <a:srgbClr val="ffffff"/>

</xml_diff>